<commit_message>
Added Research Proposal Template
</commit_message>
<xml_diff>
--- a/11. CPJ/BDSE07-CPJ-0922_FrancisAbarrca_SA/BDSE07-CPJ-0922_FrancisAbarca_ProblemManagementReportPPT.pptx
+++ b/11. CPJ/BDSE07-CPJ-0922_FrancisAbarrca_SA/BDSE07-CPJ-0922_FrancisAbarca_ProblemManagementReportPPT.pptx
@@ -3411,6 +3411,55 @@
           </a:p>
         </p:txBody>
       </p:sp>
+      <p:sp>
+        <p:nvSpPr>
+          <p:cNvPr id="13" name="object 10">
+            <a:extLst>
+              <a:ext uri="{FF2B5EF4-FFF2-40B4-BE49-F238E27FC236}">
+                <a16:creationId xmlns:a16="http://schemas.microsoft.com/office/drawing/2014/main" id="{ADACFE3E-C4C8-484E-34AF-06BD495AAE06}"/>
+              </a:ext>
+            </a:extLst>
+          </p:cNvPr>
+          <p:cNvSpPr txBox="1"/>
+          <p:nvPr/>
+        </p:nvSpPr>
+        <p:spPr>
+          <a:xfrm>
+            <a:off x="6151752" y="5282856"/>
+            <a:ext cx="2230248" cy="271934"/>
+          </a:xfrm>
+          <a:prstGeom prst="rect">
+            <a:avLst/>
+          </a:prstGeom>
+        </p:spPr>
+        <p:txBody>
+          <a:bodyPr vert="horz" wrap="square" lIns="0" tIns="12700" rIns="0" bIns="0" rtlCol="0">
+            <a:spAutoFit/>
+          </a:bodyPr>
+          <a:lstStyle/>
+          <a:p>
+            <a:pPr marR="5080">
+              <a:lnSpc>
+                <a:spcPct val="130700"/>
+              </a:lnSpc>
+              <a:spcBef>
+                <a:spcPts val="100"/>
+              </a:spcBef>
+            </a:pPr>
+            <a:r>
+              <a:rPr lang="en-US" sz="1400" b="1" dirty="0">
+                <a:latin typeface="Calibri"/>
+                <a:cs typeface="Calibri"/>
+              </a:rPr>
+              <a:t>08/23/2023</a:t>
+            </a:r>
+            <a:endParaRPr sz="1400" dirty="0">
+              <a:latin typeface="Calibri"/>
+              <a:cs typeface="Calibri"/>
+            </a:endParaRPr>
+          </a:p>
+        </p:txBody>
+      </p:sp>
     </p:spTree>
   </p:cSld>
   <p:clrMapOvr>

</xml_diff>